<commit_message>
Eclipse Workspace and PPT Added
</commit_message>
<xml_diff>
--- a/Slides/Unit 1/CS8382_U1_6_DataTypes.pptx
+++ b/Slides/Unit 1/CS8382_U1_6_DataTypes.pptx
@@ -5,7 +5,7 @@
     <p:sldMasterId id="2147483648" r:id="rId1"/>
   </p:sldMasterIdLst>
   <p:notesMasterIdLst>
-    <p:notesMasterId r:id="rId7"/>
+    <p:notesMasterId r:id="rId8"/>
   </p:notesMasterIdLst>
   <p:sldIdLst>
     <p:sldId id="256" r:id="rId2"/>
@@ -13,6 +13,7 @@
     <p:sldId id="258" r:id="rId4"/>
     <p:sldId id="259" r:id="rId5"/>
     <p:sldId id="260" r:id="rId6"/>
+    <p:sldId id="261" r:id="rId7"/>
   </p:sldIdLst>
   <p:sldSz cx="9144000" cy="6858000" type="screen4x3"/>
   <p:notesSz cx="6858000" cy="9144000"/>
@@ -196,6 +197,7 @@
           <a:p>
             <a:fld id="{9515075B-F3F0-4441-A1BD-B7B515B708FF}" type="datetimeFigureOut">
               <a:rPr lang="en-US" smtClean="0"/>
+              <a:pPr/>
               <a:t>7/8/2018</a:t>
             </a:fld>
             <a:endParaRPr lang="en-US"/>
@@ -357,6 +359,7 @@
           <a:p>
             <a:fld id="{7399046D-0A48-46A7-81AC-1A4C0754FE96}" type="slidenum">
               <a:rPr lang="en-US" smtClean="0"/>
+              <a:pPr/>
               <a:t>‹#›</a:t>
             </a:fld>
             <a:endParaRPr lang="en-US"/>
@@ -528,6 +531,7 @@
           <a:p>
             <a:fld id="{7399046D-0A48-46A7-81AC-1A4C0754FE96}" type="slidenum">
               <a:rPr lang="en-US" smtClean="0"/>
+              <a:pPr/>
               <a:t>2</a:t>
             </a:fld>
             <a:endParaRPr lang="en-US"/>
@@ -730,6 +734,7 @@
           <a:p>
             <a:fld id="{6E658DF8-B8C0-4C7F-85EB-B53A2DDD44A9}" type="datetimeFigureOut">
               <a:rPr lang="en-US" smtClean="0"/>
+              <a:pPr/>
               <a:t>7/8/2018</a:t>
             </a:fld>
             <a:endParaRPr lang="en-US"/>
@@ -772,6 +777,7 @@
           <a:p>
             <a:fld id="{6481E28F-C002-4096-B1E0-7EE74BFE7C79}" type="slidenum">
               <a:rPr lang="en-US" smtClean="0"/>
+              <a:pPr/>
               <a:t>‹#›</a:t>
             </a:fld>
             <a:endParaRPr lang="en-US"/>
@@ -895,6 +901,7 @@
           <a:p>
             <a:fld id="{6E658DF8-B8C0-4C7F-85EB-B53A2DDD44A9}" type="datetimeFigureOut">
               <a:rPr lang="en-US" smtClean="0"/>
+              <a:pPr/>
               <a:t>7/8/2018</a:t>
             </a:fld>
             <a:endParaRPr lang="en-US"/>
@@ -937,6 +944,7 @@
           <a:p>
             <a:fld id="{6481E28F-C002-4096-B1E0-7EE74BFE7C79}" type="slidenum">
               <a:rPr lang="en-US" smtClean="0"/>
+              <a:pPr/>
               <a:t>‹#›</a:t>
             </a:fld>
             <a:endParaRPr lang="en-US"/>
@@ -1070,6 +1078,7 @@
           <a:p>
             <a:fld id="{6E658DF8-B8C0-4C7F-85EB-B53A2DDD44A9}" type="datetimeFigureOut">
               <a:rPr lang="en-US" smtClean="0"/>
+              <a:pPr/>
               <a:t>7/8/2018</a:t>
             </a:fld>
             <a:endParaRPr lang="en-US"/>
@@ -1112,6 +1121,7 @@
           <a:p>
             <a:fld id="{6481E28F-C002-4096-B1E0-7EE74BFE7C79}" type="slidenum">
               <a:rPr lang="en-US" smtClean="0"/>
+              <a:pPr/>
               <a:t>‹#›</a:t>
             </a:fld>
             <a:endParaRPr lang="en-US"/>
@@ -1267,6 +1277,7 @@
           <a:p>
             <a:fld id="{6E658DF8-B8C0-4C7F-85EB-B53A2DDD44A9}" type="datetimeFigureOut">
               <a:rPr lang="en-US" smtClean="0"/>
+              <a:pPr/>
               <a:t>7/8/2018</a:t>
             </a:fld>
             <a:endParaRPr lang="en-US"/>
@@ -1309,6 +1320,7 @@
           <a:p>
             <a:fld id="{6481E28F-C002-4096-B1E0-7EE74BFE7C79}" type="slidenum">
               <a:rPr lang="en-US" smtClean="0"/>
+              <a:pPr/>
               <a:t>‹#›</a:t>
             </a:fld>
             <a:endParaRPr lang="en-US"/>
@@ -1508,6 +1520,7 @@
           <a:p>
             <a:fld id="{6E658DF8-B8C0-4C7F-85EB-B53A2DDD44A9}" type="datetimeFigureOut">
               <a:rPr lang="en-US" smtClean="0"/>
+              <a:pPr/>
               <a:t>7/8/2018</a:t>
             </a:fld>
             <a:endParaRPr lang="en-US"/>
@@ -1550,6 +1563,7 @@
           <a:p>
             <a:fld id="{6481E28F-C002-4096-B1E0-7EE74BFE7C79}" type="slidenum">
               <a:rPr lang="en-US" smtClean="0"/>
+              <a:pPr/>
               <a:t>‹#›</a:t>
             </a:fld>
             <a:endParaRPr lang="en-US"/>
@@ -1791,6 +1805,7 @@
           <a:p>
             <a:fld id="{6E658DF8-B8C0-4C7F-85EB-B53A2DDD44A9}" type="datetimeFigureOut">
               <a:rPr lang="en-US" smtClean="0"/>
+              <a:pPr/>
               <a:t>7/8/2018</a:t>
             </a:fld>
             <a:endParaRPr lang="en-US"/>
@@ -1833,6 +1848,7 @@
           <a:p>
             <a:fld id="{6481E28F-C002-4096-B1E0-7EE74BFE7C79}" type="slidenum">
               <a:rPr lang="en-US" smtClean="0"/>
+              <a:pPr/>
               <a:t>‹#›</a:t>
             </a:fld>
             <a:endParaRPr lang="en-US"/>
@@ -2208,6 +2224,7 @@
           <a:p>
             <a:fld id="{6E658DF8-B8C0-4C7F-85EB-B53A2DDD44A9}" type="datetimeFigureOut">
               <a:rPr lang="en-US" smtClean="0"/>
+              <a:pPr/>
               <a:t>7/8/2018</a:t>
             </a:fld>
             <a:endParaRPr lang="en-US"/>
@@ -2250,6 +2267,7 @@
           <a:p>
             <a:fld id="{6481E28F-C002-4096-B1E0-7EE74BFE7C79}" type="slidenum">
               <a:rPr lang="en-US" smtClean="0"/>
+              <a:pPr/>
               <a:t>‹#›</a:t>
             </a:fld>
             <a:endParaRPr lang="en-US"/>
@@ -2321,6 +2339,7 @@
           <a:p>
             <a:fld id="{6E658DF8-B8C0-4C7F-85EB-B53A2DDD44A9}" type="datetimeFigureOut">
               <a:rPr lang="en-US" smtClean="0"/>
+              <a:pPr/>
               <a:t>7/8/2018</a:t>
             </a:fld>
             <a:endParaRPr lang="en-US"/>
@@ -2363,6 +2382,7 @@
           <a:p>
             <a:fld id="{6481E28F-C002-4096-B1E0-7EE74BFE7C79}" type="slidenum">
               <a:rPr lang="en-US" smtClean="0"/>
+              <a:pPr/>
               <a:t>‹#›</a:t>
             </a:fld>
             <a:endParaRPr lang="en-US"/>
@@ -2411,6 +2431,7 @@
           <a:p>
             <a:fld id="{6E658DF8-B8C0-4C7F-85EB-B53A2DDD44A9}" type="datetimeFigureOut">
               <a:rPr lang="en-US" smtClean="0"/>
+              <a:pPr/>
               <a:t>7/8/2018</a:t>
             </a:fld>
             <a:endParaRPr lang="en-US"/>
@@ -2453,6 +2474,7 @@
           <a:p>
             <a:fld id="{6481E28F-C002-4096-B1E0-7EE74BFE7C79}" type="slidenum">
               <a:rPr lang="en-US" smtClean="0"/>
+              <a:pPr/>
               <a:t>‹#›</a:t>
             </a:fld>
             <a:endParaRPr lang="en-US"/>
@@ -2683,6 +2705,7 @@
           <a:p>
             <a:fld id="{6E658DF8-B8C0-4C7F-85EB-B53A2DDD44A9}" type="datetimeFigureOut">
               <a:rPr lang="en-US" smtClean="0"/>
+              <a:pPr/>
               <a:t>7/8/2018</a:t>
             </a:fld>
             <a:endParaRPr lang="en-US"/>
@@ -2725,6 +2748,7 @@
           <a:p>
             <a:fld id="{6481E28F-C002-4096-B1E0-7EE74BFE7C79}" type="slidenum">
               <a:rPr lang="en-US" smtClean="0"/>
+              <a:pPr/>
               <a:t>‹#›</a:t>
             </a:fld>
             <a:endParaRPr lang="en-US"/>
@@ -2931,6 +2955,7 @@
           <a:p>
             <a:fld id="{6E658DF8-B8C0-4C7F-85EB-B53A2DDD44A9}" type="datetimeFigureOut">
               <a:rPr lang="en-US" smtClean="0"/>
+              <a:pPr/>
               <a:t>7/8/2018</a:t>
             </a:fld>
             <a:endParaRPr lang="en-US"/>
@@ -2973,6 +2998,7 @@
           <a:p>
             <a:fld id="{6481E28F-C002-4096-B1E0-7EE74BFE7C79}" type="slidenum">
               <a:rPr lang="en-US" smtClean="0"/>
+              <a:pPr/>
               <a:t>‹#›</a:t>
             </a:fld>
             <a:endParaRPr lang="en-US"/>
@@ -3145,6 +3171,7 @@
           <a:p>
             <a:fld id="{6E658DF8-B8C0-4C7F-85EB-B53A2DDD44A9}" type="datetimeFigureOut">
               <a:rPr lang="en-US" smtClean="0"/>
+              <a:pPr/>
               <a:t>7/8/2018</a:t>
             </a:fld>
             <a:endParaRPr lang="en-US"/>
@@ -3223,6 +3250,7 @@
           <a:p>
             <a:fld id="{6481E28F-C002-4096-B1E0-7EE74BFE7C79}" type="slidenum">
               <a:rPr lang="en-US" smtClean="0"/>
+              <a:pPr/>
               <a:t>‹#›</a:t>
             </a:fld>
             <a:endParaRPr lang="en-US"/>
@@ -5823,6 +5851,69 @@
           </a:graphicData>
         </a:graphic>
       </p:graphicFrame>
+    </p:spTree>
+  </p:cSld>
+  <p:clrMapOvr>
+    <a:masterClrMapping/>
+  </p:clrMapOvr>
+</p:sld>
+</file>
+
+<file path=ppt/slides/slide6.xml><?xml version="1.0" encoding="utf-8"?>
+<p:sld xmlns:a="http://schemas.openxmlformats.org/drawingml/2006/main" xmlns:r="http://schemas.openxmlformats.org/officeDocument/2006/relationships" xmlns:p="http://schemas.openxmlformats.org/presentationml/2006/main">
+  <p:cSld>
+    <p:spTree>
+      <p:nvGrpSpPr>
+        <p:cNvPr id="1" name=""/>
+        <p:cNvGrpSpPr/>
+        <p:nvPr/>
+      </p:nvGrpSpPr>
+      <p:grpSpPr>
+        <a:xfrm>
+          <a:off x="0" y="0"/>
+          <a:ext cx="0" cy="0"/>
+          <a:chOff x="0" y="0"/>
+          <a:chExt cx="0" cy="0"/>
+        </a:xfrm>
+      </p:grpSpPr>
+      <p:sp>
+        <p:nvSpPr>
+          <p:cNvPr id="2" name="Title 1"/>
+          <p:cNvSpPr>
+            <a:spLocks noGrp="1"/>
+          </p:cNvSpPr>
+          <p:nvPr>
+            <p:ph type="title"/>
+          </p:nvPr>
+        </p:nvSpPr>
+        <p:spPr/>
+        <p:txBody>
+          <a:bodyPr/>
+          <a:lstStyle/>
+          <a:p>
+            <a:endParaRPr lang="en-US"/>
+          </a:p>
+        </p:txBody>
+      </p:sp>
+      <p:sp>
+        <p:nvSpPr>
+          <p:cNvPr id="3" name="Content Placeholder 2"/>
+          <p:cNvSpPr>
+            <a:spLocks noGrp="1"/>
+          </p:cNvSpPr>
+          <p:nvPr>
+            <p:ph idx="1"/>
+          </p:nvPr>
+        </p:nvSpPr>
+        <p:spPr/>
+        <p:txBody>
+          <a:bodyPr/>
+          <a:lstStyle/>
+          <a:p>
+            <a:endParaRPr lang="en-US"/>
+          </a:p>
+        </p:txBody>
+      </p:sp>
     </p:spTree>
   </p:cSld>
   <p:clrMapOvr>

</xml_diff>